<commit_message>
T-Fuzz: Fuzzing by Program Transformation
</commit_message>
<xml_diff>
--- a/Presentation/20181022_Rabin.pptx
+++ b/Presentation/20181022_Rabin.pptx
@@ -228,7 +228,7 @@
             <a:fld id="{CB3D2ACE-279A-4319-8204-FE4A3DAF1277}" type="datetimeFigureOut">
               <a:rPr lang="en-US" smtClean="0"/>
               <a:pPr/>
-              <a:t>10/22/18</a:t>
+              <a:t>9/5/19</a:t>
             </a:fld>
             <a:endParaRPr lang="en-US"/>
           </a:p>
@@ -2553,7 +2553,7 @@
             <a:fld id="{B61BEF0D-F0BB-DE4B-95CE-6DB70DBA9567}" type="datetimeFigureOut">
               <a:rPr lang="en-US" smtClean="0"/>
               <a:pPr/>
-              <a:t>10/22/18</a:t>
+              <a:t>9/5/19</a:t>
             </a:fld>
             <a:endParaRPr lang="en-US" dirty="0"/>
           </a:p>
@@ -2734,7 +2734,7 @@
             <a:fld id="{B61BEF0D-F0BB-DE4B-95CE-6DB70DBA9567}" type="datetimeFigureOut">
               <a:rPr lang="en-US" smtClean="0"/>
               <a:pPr/>
-              <a:t>10/22/18</a:t>
+              <a:t>9/5/19</a:t>
             </a:fld>
             <a:endParaRPr lang="en-US" dirty="0"/>
           </a:p>
@@ -2916,7 +2916,7 @@
             <a:fld id="{B61BEF0D-F0BB-DE4B-95CE-6DB70DBA9567}" type="datetimeFigureOut">
               <a:rPr lang="en-US" smtClean="0"/>
               <a:pPr/>
-              <a:t>10/22/18</a:t>
+              <a:t>9/5/19</a:t>
             </a:fld>
             <a:endParaRPr lang="en-US" dirty="0"/>
           </a:p>
@@ -3088,7 +3088,7 @@
             <a:fld id="{B61BEF0D-F0BB-DE4B-95CE-6DB70DBA9567}" type="datetimeFigureOut">
               <a:rPr lang="en-US" smtClean="0"/>
               <a:pPr/>
-              <a:t>10/22/18</a:t>
+              <a:t>9/5/19</a:t>
             </a:fld>
             <a:endParaRPr lang="en-US" dirty="0"/>
           </a:p>
@@ -3403,7 +3403,7 @@
             <a:fld id="{B61BEF0D-F0BB-DE4B-95CE-6DB70DBA9567}" type="datetimeFigureOut">
               <a:rPr lang="en-US" smtClean="0"/>
               <a:pPr/>
-              <a:t>10/22/18</a:t>
+              <a:t>9/5/19</a:t>
             </a:fld>
             <a:endParaRPr lang="en-US" dirty="0"/>
           </a:p>
@@ -3791,7 +3791,7 @@
             <a:fld id="{B61BEF0D-F0BB-DE4B-95CE-6DB70DBA9567}" type="datetimeFigureOut">
               <a:rPr lang="en-US" smtClean="0"/>
               <a:pPr/>
-              <a:t>10/22/18</a:t>
+              <a:t>9/5/19</a:t>
             </a:fld>
             <a:endParaRPr lang="en-US" dirty="0"/>
           </a:p>
@@ -4227,7 +4227,7 @@
             <a:fld id="{B61BEF0D-F0BB-DE4B-95CE-6DB70DBA9567}" type="datetimeFigureOut">
               <a:rPr lang="en-US" smtClean="0"/>
               <a:pPr/>
-              <a:t>10/22/18</a:t>
+              <a:t>9/5/19</a:t>
             </a:fld>
             <a:endParaRPr lang="en-US" dirty="0"/>
           </a:p>
@@ -4347,7 +4347,7 @@
             <a:fld id="{B61BEF0D-F0BB-DE4B-95CE-6DB70DBA9567}" type="datetimeFigureOut">
               <a:rPr lang="en-US" smtClean="0"/>
               <a:pPr/>
-              <a:t>10/22/18</a:t>
+              <a:t>9/5/19</a:t>
             </a:fld>
             <a:endParaRPr lang="en-US" dirty="0"/>
           </a:p>
@@ -4444,7 +4444,7 @@
             <a:fld id="{B61BEF0D-F0BB-DE4B-95CE-6DB70DBA9567}" type="datetimeFigureOut">
               <a:rPr lang="en-US" smtClean="0"/>
               <a:pPr/>
-              <a:t>10/22/18</a:t>
+              <a:t>9/5/19</a:t>
             </a:fld>
             <a:endParaRPr lang="en-US" dirty="0"/>
           </a:p>
@@ -4796,7 +4796,7 @@
             <a:fld id="{B61BEF0D-F0BB-DE4B-95CE-6DB70DBA9567}" type="datetimeFigureOut">
               <a:rPr lang="en-US" smtClean="0"/>
               <a:pPr/>
-              <a:t>10/22/18</a:t>
+              <a:t>9/5/19</a:t>
             </a:fld>
             <a:endParaRPr lang="en-US" dirty="0"/>
           </a:p>
@@ -5223,7 +5223,7 @@
             <a:fld id="{B61BEF0D-F0BB-DE4B-95CE-6DB70DBA9567}" type="datetimeFigureOut">
               <a:rPr lang="en-US" smtClean="0"/>
               <a:pPr/>
-              <a:t>10/22/18</a:t>
+              <a:t>9/5/19</a:t>
             </a:fld>
             <a:endParaRPr lang="en-US" dirty="0"/>
           </a:p>
@@ -5506,7 +5506,7 @@
             <a:fld id="{B61BEF0D-F0BB-DE4B-95CE-6DB70DBA9567}" type="datetimeFigureOut">
               <a:rPr lang="en-US" smtClean="0"/>
               <a:pPr/>
-              <a:t>10/22/18</a:t>
+              <a:t>9/5/19</a:t>
             </a:fld>
             <a:endParaRPr lang="en-US" dirty="0"/>
           </a:p>
@@ -6209,7 +6209,7 @@
                 <a:latin typeface="Times New Roman" panose="02020603050405020304" pitchFamily="18" charset="0"/>
                 <a:cs typeface="Times New Roman" panose="02020603050405020304" pitchFamily="18" charset="0"/>
               </a:rPr>
-              <a:t>T-Fuzz: fuzzing by program transformation</a:t>
+              <a:t>T-Fuzz: Fuzzing by Program Transformation</a:t>
             </a:r>
           </a:p>
         </p:txBody>

</xml_diff>